<commit_message>
Update BIP Data analysis with Python 2.pptx
</commit_message>
<xml_diff>
--- a/BIP Data analysis with Python 2.pptx
+++ b/BIP Data analysis with Python 2.pptx
@@ -6,7 +6,7 @@
     <p:sldMasterId id="2147483702" r:id="rId5"/>
   </p:sldMasterIdLst>
   <p:notesMasterIdLst>
-    <p:notesMasterId r:id="rId22"/>
+    <p:notesMasterId r:id="rId23"/>
   </p:notesMasterIdLst>
   <p:sldIdLst>
     <p:sldId id="352" r:id="rId6"/>
@@ -21,10 +21,11 @@
     <p:sldId id="371" r:id="rId15"/>
     <p:sldId id="372" r:id="rId16"/>
     <p:sldId id="373" r:id="rId17"/>
-    <p:sldId id="384" r:id="rId18"/>
-    <p:sldId id="385" r:id="rId19"/>
-    <p:sldId id="386" r:id="rId20"/>
-    <p:sldId id="376" r:id="rId21"/>
+    <p:sldId id="387" r:id="rId18"/>
+    <p:sldId id="384" r:id="rId19"/>
+    <p:sldId id="385" r:id="rId20"/>
+    <p:sldId id="386" r:id="rId21"/>
+    <p:sldId id="376" r:id="rId22"/>
   </p:sldIdLst>
   <p:sldSz cx="12192000" cy="6858000"/>
   <p:notesSz cx="6797675" cy="9926638"/>
@@ -814,7 +815,7 @@
           <a:p>
             <a:fld id="{94A7BB3A-6586-43EE-A893-579956F833DB}" type="datetimeFigureOut">
               <a:rPr lang="en-GB" smtClean="0"/>
-              <a:t>26/01/2023</a:t>
+              <a:t>06/02/2023</a:t>
             </a:fld>
             <a:endParaRPr lang="en-GB"/>
           </a:p>
@@ -1268,7 +1269,7 @@
                 <a:tabLst/>
                 <a:defRPr/>
               </a:pPr>
-              <a:t>26/01/2023</a:t>
+              <a:t>06/02/2023</a:t>
             </a:fld>
             <a:endParaRPr kumimoji="0" lang="en-GB" sz="1200" b="0" i="0" u="none" strike="noStrike" kern="1200" cap="none" spc="0" normalizeH="0" baseline="0" noProof="0">
               <a:ln>
@@ -1656,7 +1657,7 @@
           <a:p>
             <a:fld id="{F0921295-F618-46E6-B675-22E427A3E98B}" type="datetimeFigureOut">
               <a:rPr lang="en-GB" smtClean="0"/>
-              <a:t>26/01/2023</a:t>
+              <a:t>06/02/2023</a:t>
             </a:fld>
             <a:endParaRPr lang="en-GB"/>
           </a:p>
@@ -1856,7 +1857,7 @@
           <a:p>
             <a:fld id="{F0921295-F618-46E6-B675-22E427A3E98B}" type="datetimeFigureOut">
               <a:rPr lang="en-GB" smtClean="0"/>
-              <a:t>26/01/2023</a:t>
+              <a:t>06/02/2023</a:t>
             </a:fld>
             <a:endParaRPr lang="en-GB"/>
           </a:p>
@@ -2066,7 +2067,7 @@
           <a:p>
             <a:fld id="{F0921295-F618-46E6-B675-22E427A3E98B}" type="datetimeFigureOut">
               <a:rPr lang="en-GB" smtClean="0"/>
-              <a:t>26/01/2023</a:t>
+              <a:t>06/02/2023</a:t>
             </a:fld>
             <a:endParaRPr lang="en-GB"/>
           </a:p>
@@ -2315,7 +2316,7 @@
           <a:p>
             <a:fld id="{F8FF1861-F7AB-4C06-9C12-5468460607A7}" type="datetimeFigureOut">
               <a:rPr lang="en-GB" smtClean="0"/>
-              <a:t>26/01/2023</a:t>
+              <a:t>06/02/2023</a:t>
             </a:fld>
             <a:endParaRPr lang="en-GB"/>
           </a:p>
@@ -2410,7 +2411,7 @@
           <a:p>
             <a:fld id="{F8FF1861-F7AB-4C06-9C12-5468460607A7}" type="datetimeFigureOut">
               <a:rPr lang="en-GB" smtClean="0"/>
-              <a:t>26/01/2023</a:t>
+              <a:t>06/02/2023</a:t>
             </a:fld>
             <a:endParaRPr lang="en-GB"/>
           </a:p>
@@ -2607,7 +2608,7 @@
           <a:p>
             <a:fld id="{F8FF1861-F7AB-4C06-9C12-5468460607A7}" type="datetimeFigureOut">
               <a:rPr lang="en-GB" smtClean="0"/>
-              <a:t>26/01/2023</a:t>
+              <a:t>06/02/2023</a:t>
             </a:fld>
             <a:endParaRPr lang="en-GB"/>
           </a:p>
@@ -2923,7 +2924,7 @@
           <a:p>
             <a:fld id="{F0921295-F618-46E6-B675-22E427A3E98B}" type="datetimeFigureOut">
               <a:rPr lang="en-GB" smtClean="0"/>
-              <a:t>26/01/2023</a:t>
+              <a:t>06/02/2023</a:t>
             </a:fld>
             <a:endParaRPr lang="en-GB"/>
           </a:p>
@@ -3123,7 +3124,7 @@
           <a:p>
             <a:fld id="{F0921295-F618-46E6-B675-22E427A3E98B}" type="datetimeFigureOut">
               <a:rPr lang="en-GB" smtClean="0"/>
-              <a:t>26/01/2023</a:t>
+              <a:t>06/02/2023</a:t>
             </a:fld>
             <a:endParaRPr lang="en-GB"/>
           </a:p>
@@ -3402,7 +3403,7 @@
           <a:p>
             <a:fld id="{F0921295-F618-46E6-B675-22E427A3E98B}" type="datetimeFigureOut">
               <a:rPr lang="en-GB" smtClean="0"/>
-              <a:t>26/01/2023</a:t>
+              <a:t>06/02/2023</a:t>
             </a:fld>
             <a:endParaRPr lang="en-GB"/>
           </a:p>
@@ -3670,7 +3671,7 @@
           <a:p>
             <a:fld id="{F0921295-F618-46E6-B675-22E427A3E98B}" type="datetimeFigureOut">
               <a:rPr lang="en-GB" smtClean="0"/>
-              <a:t>26/01/2023</a:t>
+              <a:t>06/02/2023</a:t>
             </a:fld>
             <a:endParaRPr lang="en-GB"/>
           </a:p>
@@ -4085,7 +4086,7 @@
           <a:p>
             <a:fld id="{F0921295-F618-46E6-B675-22E427A3E98B}" type="datetimeFigureOut">
               <a:rPr lang="en-GB" smtClean="0"/>
-              <a:t>26/01/2023</a:t>
+              <a:t>06/02/2023</a:t>
             </a:fld>
             <a:endParaRPr lang="en-GB"/>
           </a:p>
@@ -4238,7 +4239,7 @@
           <a:p>
             <a:fld id="{F0921295-F618-46E6-B675-22E427A3E98B}" type="datetimeFigureOut">
               <a:rPr lang="en-GB" smtClean="0"/>
-              <a:t>26/01/2023</a:t>
+              <a:t>06/02/2023</a:t>
             </a:fld>
             <a:endParaRPr lang="en-GB"/>
           </a:p>
@@ -4351,7 +4352,7 @@
           <a:p>
             <a:fld id="{F0921295-F618-46E6-B675-22E427A3E98B}" type="datetimeFigureOut">
               <a:rPr lang="en-GB" smtClean="0"/>
-              <a:t>26/01/2023</a:t>
+              <a:t>06/02/2023</a:t>
             </a:fld>
             <a:endParaRPr lang="en-GB"/>
           </a:p>
@@ -4664,7 +4665,7 @@
           <a:p>
             <a:fld id="{F0921295-F618-46E6-B675-22E427A3E98B}" type="datetimeFigureOut">
               <a:rPr lang="en-GB" smtClean="0"/>
-              <a:t>26/01/2023</a:t>
+              <a:t>06/02/2023</a:t>
             </a:fld>
             <a:endParaRPr lang="en-GB"/>
           </a:p>
@@ -4938,7 +4939,7 @@
                 <a:tabLst/>
                 <a:defRPr/>
               </a:pPr>
-              <a:t>26/01/2023</a:t>
+              <a:t>06/02/2023</a:t>
             </a:fld>
             <a:endParaRPr kumimoji="0" lang="en-GB" sz="1200" b="0" i="0" u="none" strike="noStrike" kern="1200" cap="none" spc="0" normalizeH="0" baseline="0" noProof="0">
               <a:ln>
@@ -5715,7 +5716,7 @@
           <a:p>
             <a:fld id="{F0921295-F618-46E6-B675-22E427A3E98B}" type="datetimeFigureOut">
               <a:rPr lang="en-GB" smtClean="0"/>
-              <a:t>26/01/2023</a:t>
+              <a:t>06/02/2023</a:t>
             </a:fld>
             <a:endParaRPr lang="en-GB"/>
           </a:p>
@@ -7165,6 +7166,205 @@
           <p:cNvPr id="2" name="Title 1">
             <a:extLst>
               <a:ext uri="{FF2B5EF4-FFF2-40B4-BE49-F238E27FC236}">
+                <a16:creationId xmlns:a16="http://schemas.microsoft.com/office/drawing/2014/main" id="{1F44CB8F-DEE5-6373-7030-8D4509205D38}"/>
+              </a:ext>
+            </a:extLst>
+          </p:cNvPr>
+          <p:cNvSpPr>
+            <a:spLocks noGrp="1"/>
+          </p:cNvSpPr>
+          <p:nvPr>
+            <p:ph type="title"/>
+          </p:nvPr>
+        </p:nvSpPr>
+        <p:spPr/>
+        <p:txBody>
+          <a:bodyPr/>
+          <a:lstStyle/>
+          <a:p>
+            <a:r>
+              <a:rPr lang="en-GB" dirty="0"/>
+              <a:t>Histogram chart</a:t>
+            </a:r>
+          </a:p>
+        </p:txBody>
+      </p:sp>
+      <p:pic>
+        <p:nvPicPr>
+          <p:cNvPr id="6" name="Content Placeholder 5">
+            <a:extLst>
+              <a:ext uri="{FF2B5EF4-FFF2-40B4-BE49-F238E27FC236}">
+                <a16:creationId xmlns:a16="http://schemas.microsoft.com/office/drawing/2014/main" id="{378FC5B7-3AFE-731A-B4A6-58EE46C63D24}"/>
+              </a:ext>
+            </a:extLst>
+          </p:cNvPr>
+          <p:cNvPicPr>
+            <a:picLocks noGrp="1" noChangeAspect="1"/>
+          </p:cNvPicPr>
+          <p:nvPr>
+            <p:ph idx="1"/>
+          </p:nvPr>
+        </p:nvPicPr>
+        <p:blipFill>
+          <a:blip r:embed="rId2"/>
+          <a:stretch>
+            <a:fillRect/>
+          </a:stretch>
+        </p:blipFill>
+        <p:spPr>
+          <a:xfrm>
+            <a:off x="5183188" y="2048219"/>
+            <a:ext cx="6172200" cy="2752037"/>
+          </a:xfrm>
+        </p:spPr>
+      </p:pic>
+      <p:sp>
+        <p:nvSpPr>
+          <p:cNvPr id="4" name="Text Placeholder 3">
+            <a:extLst>
+              <a:ext uri="{FF2B5EF4-FFF2-40B4-BE49-F238E27FC236}">
+                <a16:creationId xmlns:a16="http://schemas.microsoft.com/office/drawing/2014/main" id="{800D0AB8-5DF9-8361-1105-51A10C5F87A5}"/>
+              </a:ext>
+            </a:extLst>
+          </p:cNvPr>
+          <p:cNvSpPr>
+            <a:spLocks noGrp="1"/>
+          </p:cNvSpPr>
+          <p:nvPr>
+            <p:ph type="body" sz="half" idx="2"/>
+          </p:nvPr>
+        </p:nvSpPr>
+        <p:spPr>
+          <a:xfrm>
+            <a:off x="1806995" y="2057400"/>
+            <a:ext cx="3936473" cy="3811588"/>
+          </a:xfrm>
+        </p:spPr>
+        <p:txBody>
+          <a:bodyPr/>
+          <a:lstStyle/>
+          <a:p>
+            <a:r>
+              <a:rPr lang="en-GB" dirty="0">
+                <a:latin typeface="Courier New" panose="02070309020205020404" pitchFamily="49" charset="0"/>
+                <a:cs typeface="Courier New" panose="02070309020205020404" pitchFamily="49" charset="0"/>
+              </a:rPr>
+              <a:t>import </a:t>
+            </a:r>
+            <a:r>
+              <a:rPr lang="en-GB" dirty="0" err="1">
+                <a:latin typeface="Courier New" panose="02070309020205020404" pitchFamily="49" charset="0"/>
+                <a:cs typeface="Courier New" panose="02070309020205020404" pitchFamily="49" charset="0"/>
+              </a:rPr>
+              <a:t>plotly.express</a:t>
+            </a:r>
+            <a:r>
+              <a:rPr lang="en-GB" dirty="0">
+                <a:latin typeface="Courier New" panose="02070309020205020404" pitchFamily="49" charset="0"/>
+                <a:cs typeface="Courier New" panose="02070309020205020404" pitchFamily="49" charset="0"/>
+              </a:rPr>
+              <a:t> as </a:t>
+            </a:r>
+            <a:r>
+              <a:rPr lang="en-GB" dirty="0" err="1">
+                <a:latin typeface="Courier New" panose="02070309020205020404" pitchFamily="49" charset="0"/>
+                <a:cs typeface="Courier New" panose="02070309020205020404" pitchFamily="49" charset="0"/>
+              </a:rPr>
+              <a:t>px</a:t>
+            </a:r>
+            <a:endParaRPr lang="en-GB" dirty="0">
+              <a:latin typeface="Courier New" panose="02070309020205020404" pitchFamily="49" charset="0"/>
+              <a:cs typeface="Courier New" panose="02070309020205020404" pitchFamily="49" charset="0"/>
+            </a:endParaRPr>
+          </a:p>
+          <a:p>
+            <a:r>
+              <a:rPr lang="en-GB" dirty="0" err="1">
+                <a:latin typeface="Courier New" panose="02070309020205020404" pitchFamily="49" charset="0"/>
+                <a:cs typeface="Courier New" panose="02070309020205020404" pitchFamily="49" charset="0"/>
+              </a:rPr>
+              <a:t>px.histogram</a:t>
+            </a:r>
+            <a:r>
+              <a:rPr lang="en-GB" dirty="0">
+                <a:latin typeface="Courier New" panose="02070309020205020404" pitchFamily="49" charset="0"/>
+                <a:cs typeface="Courier New" panose="02070309020205020404" pitchFamily="49" charset="0"/>
+              </a:rPr>
+              <a:t>(</a:t>
+            </a:r>
+            <a:r>
+              <a:rPr lang="en-GB" dirty="0" err="1">
+                <a:latin typeface="Courier New" panose="02070309020205020404" pitchFamily="49" charset="0"/>
+                <a:cs typeface="Courier New" panose="02070309020205020404" pitchFamily="49" charset="0"/>
+              </a:rPr>
+              <a:t>df</a:t>
+            </a:r>
+            <a:r>
+              <a:rPr lang="en-GB" dirty="0">
+                <a:latin typeface="Courier New" panose="02070309020205020404" pitchFamily="49" charset="0"/>
+                <a:cs typeface="Courier New" panose="02070309020205020404" pitchFamily="49" charset="0"/>
+              </a:rPr>
+              <a:t>, y="Weight (kg)", </a:t>
+            </a:r>
+            <a:r>
+              <a:rPr lang="en-GB" dirty="0" err="1">
+                <a:latin typeface="Courier New" panose="02070309020205020404" pitchFamily="49" charset="0"/>
+                <a:cs typeface="Courier New" panose="02070309020205020404" pitchFamily="49" charset="0"/>
+              </a:rPr>
+              <a:t>color</a:t>
+            </a:r>
+            <a:r>
+              <a:rPr lang="en-GB" dirty="0">
+                <a:latin typeface="Courier New" panose="02070309020205020404" pitchFamily="49" charset="0"/>
+                <a:cs typeface="Courier New" panose="02070309020205020404" pitchFamily="49" charset="0"/>
+              </a:rPr>
+              <a:t>="Breed Name</a:t>
+            </a:r>
+            <a:r>
+              <a:rPr lang="en-GB" dirty="0"/>
+              <a:t>")</a:t>
+            </a:r>
+          </a:p>
+          <a:p>
+            <a:endParaRPr lang="en-GB" dirty="0"/>
+          </a:p>
+        </p:txBody>
+      </p:sp>
+    </p:spTree>
+    <p:extLst>
+      <p:ext uri="{BB962C8B-B14F-4D97-AF65-F5344CB8AC3E}">
+        <p14:creationId xmlns:p14="http://schemas.microsoft.com/office/powerpoint/2010/main" val="2851827552"/>
+      </p:ext>
+    </p:extLst>
+  </p:cSld>
+  <p:clrMapOvr>
+    <a:masterClrMapping/>
+  </p:clrMapOvr>
+</p:sld>
+</file>
+
+<file path=ppt/slides/slide14.xml><?xml version="1.0" encoding="utf-8"?>
+<p:sld xmlns:a="http://schemas.openxmlformats.org/drawingml/2006/main" xmlns:r="http://schemas.openxmlformats.org/officeDocument/2006/relationships" xmlns:p="http://schemas.openxmlformats.org/presentationml/2006/main">
+  <p:cSld>
+    <p:spTree>
+      <p:nvGrpSpPr>
+        <p:cNvPr id="1" name=""/>
+        <p:cNvGrpSpPr/>
+        <p:nvPr/>
+      </p:nvGrpSpPr>
+      <p:grpSpPr>
+        <a:xfrm>
+          <a:off x="0" y="0"/>
+          <a:ext cx="0" cy="0"/>
+          <a:chOff x="0" y="0"/>
+          <a:chExt cx="0" cy="0"/>
+        </a:xfrm>
+      </p:grpSpPr>
+      <p:sp>
+        <p:nvSpPr>
+          <p:cNvPr id="2" name="Title 1">
+            <a:extLst>
+              <a:ext uri="{FF2B5EF4-FFF2-40B4-BE49-F238E27FC236}">
                 <a16:creationId xmlns:a16="http://schemas.microsoft.com/office/drawing/2014/main" id="{DB2CD3B8-F7FB-489E-30CA-6FE986EA86AB}"/>
               </a:ext>
             </a:extLst>
@@ -7387,7 +7587,7 @@
 </p:sld>
 </file>
 
-<file path=ppt/slides/slide14.xml><?xml version="1.0" encoding="utf-8"?>
+<file path=ppt/slides/slide15.xml><?xml version="1.0" encoding="utf-8"?>
 <p:sld xmlns:a="http://schemas.openxmlformats.org/drawingml/2006/main" xmlns:r="http://schemas.openxmlformats.org/officeDocument/2006/relationships" xmlns:p="http://schemas.openxmlformats.org/presentationml/2006/main">
   <p:cSld>
     <p:spTree>
@@ -7503,7 +7703,7 @@
 </p:sld>
 </file>
 
-<file path=ppt/slides/slide15.xml><?xml version="1.0" encoding="utf-8"?>
+<file path=ppt/slides/slide16.xml><?xml version="1.0" encoding="utf-8"?>
 <p:sld xmlns:a="http://schemas.openxmlformats.org/drawingml/2006/main" xmlns:r="http://schemas.openxmlformats.org/officeDocument/2006/relationships" xmlns:p="http://schemas.openxmlformats.org/presentationml/2006/main">
   <p:cSld>
     <p:spTree>
@@ -7597,7 +7797,7 @@
 </p:sld>
 </file>
 
-<file path=ppt/slides/slide16.xml><?xml version="1.0" encoding="utf-8"?>
+<file path=ppt/slides/slide17.xml><?xml version="1.0" encoding="utf-8"?>
 <p:sld xmlns:a="http://schemas.openxmlformats.org/drawingml/2006/main" xmlns:r="http://schemas.openxmlformats.org/officeDocument/2006/relationships" xmlns:p="http://schemas.openxmlformats.org/presentationml/2006/main">
   <p:cSld>
     <p:spTree>
@@ -10540,6 +10740,12 @@
 </file>
 
 <file path=customXml/item2.xml><?xml version="1.0" encoding="utf-8"?>
+<p:properties xmlns:p="http://schemas.microsoft.com/office/2006/metadata/properties" xmlns:xsi="http://www.w3.org/2001/XMLSchema-instance" xmlns:pc="http://schemas.microsoft.com/office/infopath/2007/PartnerControls">
+  <documentManagement/>
+</p:properties>
+</file>
+
+<file path=customXml/item3.xml><?xml version="1.0" encoding="utf-8"?>
 <ct:contentTypeSchema xmlns:ct="http://schemas.microsoft.com/office/2006/metadata/contentType" xmlns:ma="http://schemas.microsoft.com/office/2006/metadata/properties/metaAttributes" ct:_="" ma:_="" ma:contentTypeName="Document" ma:contentTypeID="0x010100DCDF5AC912C6EA4BB09BF401661F1453" ma:contentTypeVersion="13" ma:contentTypeDescription="Create a new document." ma:contentTypeScope="" ma:versionID="c291281a12770b35eef0ba647833cbe5">
   <xsd:schema xmlns:xsd="http://www.w3.org/2001/XMLSchema" xmlns:xs="http://www.w3.org/2001/XMLSchema" xmlns:p="http://schemas.microsoft.com/office/2006/metadata/properties" xmlns:ns3="48e19d1c-8ee5-46f0-931b-038fc167ec2d" xmlns:ns4="f1448a4f-c496-4f45-8796-5407c200d9ee" targetNamespace="http://schemas.microsoft.com/office/2006/metadata/properties" ma:root="true" ma:fieldsID="0dcdb64b759c4351cc0c610a89f3ba64" ns3:_="" ns4:_="">
     <xsd:import namespace="48e19d1c-8ee5-46f0-931b-038fc167ec2d"/>
@@ -10762,12 +10968,6 @@
 </ct:contentTypeSchema>
 </file>
 
-<file path=customXml/item3.xml><?xml version="1.0" encoding="utf-8"?>
-<p:properties xmlns:p="http://schemas.microsoft.com/office/2006/metadata/properties" xmlns:xsi="http://www.w3.org/2001/XMLSchema-instance" xmlns:pc="http://schemas.microsoft.com/office/infopath/2007/PartnerControls">
-  <documentManagement/>
-</p:properties>
-</file>
-
 <file path=customXml/itemProps1.xml><?xml version="1.0" encoding="utf-8"?>
 <ds:datastoreItem xmlns:ds="http://schemas.openxmlformats.org/officeDocument/2006/customXml" ds:itemID="{B78C18E8-5956-4005-88B6-24E50F597E86}">
   <ds:schemaRefs>
@@ -10777,6 +10977,23 @@
 </file>
 
 <file path=customXml/itemProps2.xml><?xml version="1.0" encoding="utf-8"?>
+<ds:datastoreItem xmlns:ds="http://schemas.openxmlformats.org/officeDocument/2006/customXml" ds:itemID="{39F53F71-995B-4347-AE24-486627DF4DE7}">
+  <ds:schemaRefs>
+    <ds:schemaRef ds:uri="http://www.w3.org/XML/1998/namespace"/>
+    <ds:schemaRef ds:uri="http://schemas.microsoft.com/office/2006/metadata/properties"/>
+    <ds:schemaRef ds:uri="http://purl.org/dc/terms/"/>
+    <ds:schemaRef ds:uri="http://schemas.openxmlformats.org/package/2006/metadata/core-properties"/>
+    <ds:schemaRef ds:uri="http://purl.org/dc/dcmitype/"/>
+    <ds:schemaRef ds:uri="http://schemas.microsoft.com/office/2006/documentManagement/types"/>
+    <ds:schemaRef ds:uri="http://purl.org/dc/elements/1.1/"/>
+    <ds:schemaRef ds:uri="http://schemas.microsoft.com/office/infopath/2007/PartnerControls"/>
+    <ds:schemaRef ds:uri="f1448a4f-c496-4f45-8796-5407c200d9ee"/>
+    <ds:schemaRef ds:uri="48e19d1c-8ee5-46f0-931b-038fc167ec2d"/>
+  </ds:schemaRefs>
+</ds:datastoreItem>
+</file>
+
+<file path=customXml/itemProps3.xml><?xml version="1.0" encoding="utf-8"?>
 <ds:datastoreItem xmlns:ds="http://schemas.openxmlformats.org/officeDocument/2006/customXml" ds:itemID="{27F1CE32-01DC-45FA-A276-6DC03EDBF418}">
   <ds:schemaRefs>
     <ds:schemaRef ds:uri="48e19d1c-8ee5-46f0-931b-038fc167ec2d"/>
@@ -10794,21 +11011,4 @@
     <ds:schemaRef ds:uri="http://www.w3.org/2001/XMLSchema"/>
   </ds:schemaRefs>
 </ds:datastoreItem>
-</file>
-
-<file path=customXml/itemProps3.xml><?xml version="1.0" encoding="utf-8"?>
-<ds:datastoreItem xmlns:ds="http://schemas.openxmlformats.org/officeDocument/2006/customXml" ds:itemID="{39F53F71-995B-4347-AE24-486627DF4DE7}">
-  <ds:schemaRefs>
-    <ds:schemaRef ds:uri="http://www.w3.org/XML/1998/namespace"/>
-    <ds:schemaRef ds:uri="http://schemas.microsoft.com/office/2006/metadata/properties"/>
-    <ds:schemaRef ds:uri="http://purl.org/dc/terms/"/>
-    <ds:schemaRef ds:uri="http://schemas.openxmlformats.org/package/2006/metadata/core-properties"/>
-    <ds:schemaRef ds:uri="http://purl.org/dc/dcmitype/"/>
-    <ds:schemaRef ds:uri="http://schemas.microsoft.com/office/2006/documentManagement/types"/>
-    <ds:schemaRef ds:uri="http://purl.org/dc/elements/1.1/"/>
-    <ds:schemaRef ds:uri="http://schemas.microsoft.com/office/infopath/2007/PartnerControls"/>
-    <ds:schemaRef ds:uri="f1448a4f-c496-4f45-8796-5407c200d9ee"/>
-    <ds:schemaRef ds:uri="48e19d1c-8ee5-46f0-931b-038fc167ec2d"/>
-  </ds:schemaRefs>
-</ds:datastoreItem>
 </file>
</xml_diff>